<commit_message>
Update auto-craw and fil scores script
</commit_message>
<xml_diff>
--- a/IT002-OOP/Lab 1. BasicCplusplus.pptx
+++ b/IT002-OOP/Lab 1. BasicCplusplus.pptx
@@ -248,7 +248,7 @@
           <a:p>
             <a:fld id="{199A3582-EB61-4765-8E60-B3244E8DDD3F}" type="datetimeFigureOut">
               <a:rPr lang="en-US" smtClean="0"/>
-              <a:t>2/21/2022</a:t>
+              <a:t>3/7/2022</a:t>
             </a:fld>
             <a:endParaRPr lang="en-US"/>
           </a:p>
@@ -416,7 +416,7 @@
           <a:p>
             <a:fld id="{199A3582-EB61-4765-8E60-B3244E8DDD3F}" type="datetimeFigureOut">
               <a:rPr lang="en-US" smtClean="0"/>
-              <a:t>2/21/2022</a:t>
+              <a:t>3/7/2022</a:t>
             </a:fld>
             <a:endParaRPr lang="en-US"/>
           </a:p>
@@ -594,7 +594,7 @@
           <a:p>
             <a:fld id="{199A3582-EB61-4765-8E60-B3244E8DDD3F}" type="datetimeFigureOut">
               <a:rPr lang="en-US" smtClean="0"/>
-              <a:t>2/21/2022</a:t>
+              <a:t>3/7/2022</a:t>
             </a:fld>
             <a:endParaRPr lang="en-US"/>
           </a:p>
@@ -762,7 +762,7 @@
           <a:p>
             <a:fld id="{199A3582-EB61-4765-8E60-B3244E8DDD3F}" type="datetimeFigureOut">
               <a:rPr lang="en-US" smtClean="0"/>
-              <a:t>2/21/2022</a:t>
+              <a:t>3/7/2022</a:t>
             </a:fld>
             <a:endParaRPr lang="en-US"/>
           </a:p>
@@ -1007,7 +1007,7 @@
           <a:p>
             <a:fld id="{199A3582-EB61-4765-8E60-B3244E8DDD3F}" type="datetimeFigureOut">
               <a:rPr lang="en-US" smtClean="0"/>
-              <a:t>2/21/2022</a:t>
+              <a:t>3/7/2022</a:t>
             </a:fld>
             <a:endParaRPr lang="en-US"/>
           </a:p>
@@ -1236,7 +1236,7 @@
           <a:p>
             <a:fld id="{199A3582-EB61-4765-8E60-B3244E8DDD3F}" type="datetimeFigureOut">
               <a:rPr lang="en-US" smtClean="0"/>
-              <a:t>2/21/2022</a:t>
+              <a:t>3/7/2022</a:t>
             </a:fld>
             <a:endParaRPr lang="en-US"/>
           </a:p>
@@ -1600,7 +1600,7 @@
           <a:p>
             <a:fld id="{199A3582-EB61-4765-8E60-B3244E8DDD3F}" type="datetimeFigureOut">
               <a:rPr lang="en-US" smtClean="0"/>
-              <a:t>2/21/2022</a:t>
+              <a:t>3/7/2022</a:t>
             </a:fld>
             <a:endParaRPr lang="en-US"/>
           </a:p>
@@ -1717,7 +1717,7 @@
           <a:p>
             <a:fld id="{199A3582-EB61-4765-8E60-B3244E8DDD3F}" type="datetimeFigureOut">
               <a:rPr lang="en-US" smtClean="0"/>
-              <a:t>2/21/2022</a:t>
+              <a:t>3/7/2022</a:t>
             </a:fld>
             <a:endParaRPr lang="en-US"/>
           </a:p>
@@ -1812,7 +1812,7 @@
           <a:p>
             <a:fld id="{199A3582-EB61-4765-8E60-B3244E8DDD3F}" type="datetimeFigureOut">
               <a:rPr lang="en-US" smtClean="0"/>
-              <a:t>2/21/2022</a:t>
+              <a:t>3/7/2022</a:t>
             </a:fld>
             <a:endParaRPr lang="en-US"/>
           </a:p>
@@ -2087,7 +2087,7 @@
           <a:p>
             <a:fld id="{199A3582-EB61-4765-8E60-B3244E8DDD3F}" type="datetimeFigureOut">
               <a:rPr lang="en-US" smtClean="0"/>
-              <a:t>2/21/2022</a:t>
+              <a:t>3/7/2022</a:t>
             </a:fld>
             <a:endParaRPr lang="en-US"/>
           </a:p>
@@ -2339,7 +2339,7 @@
           <a:p>
             <a:fld id="{199A3582-EB61-4765-8E60-B3244E8DDD3F}" type="datetimeFigureOut">
               <a:rPr lang="en-US" smtClean="0"/>
-              <a:t>2/21/2022</a:t>
+              <a:t>3/7/2022</a:t>
             </a:fld>
             <a:endParaRPr lang="en-US"/>
           </a:p>
@@ -2550,7 +2550,7 @@
           <a:p>
             <a:fld id="{199A3582-EB61-4765-8E60-B3244E8DDD3F}" type="datetimeFigureOut">
               <a:rPr lang="en-US" smtClean="0"/>
-              <a:t>2/21/2022</a:t>
+              <a:t>3/7/2022</a:t>
             </a:fld>
             <a:endParaRPr lang="en-US"/>
           </a:p>
@@ -3015,7 +3015,17 @@
             <a:pPr algn="l"/>
             <a:r>
               <a:rPr lang="en-US"/>
-              <a:t>Email: haivt@uit.edu.vn</a:t>
+              <a:t>Email: </a:t>
+            </a:r>
+            <a:r>
+              <a:rPr lang="en-US">
+                <a:hlinkClick r:id="rId2"/>
+              </a:rPr>
+              <a:t>haivt@uit.edu.vn</a:t>
+            </a:r>
+            <a:r>
+              <a:rPr lang="en-US"/>
+              <a:t>. SĐT: 0814822188</a:t>
             </a:r>
           </a:p>
           <a:p>
@@ -3029,7 +3039,7 @@
             <a:pPr algn="l"/>
             <a:r>
               <a:rPr lang="en-US"/>
-              <a:t>Tài liệu học tập: moodle hoặc https://www.facebook.com/groups/bht.cnpm.uit</a:t>
+              <a:t>Tài liệu học tập: moodle hoặc https://fb.com/groups/bht.cnpm.uit</a:t>
             </a:r>
           </a:p>
         </p:txBody>
@@ -3087,7 +3097,7 @@
             <a:pPr algn="l"/>
             <a:r>
               <a:rPr lang="en-US"/>
-              <a:t>Cơ cấu điểm thực hành</a:t>
+              <a:t>Giới thiệu</a:t>
             </a:r>
           </a:p>
         </p:txBody>
@@ -3124,14 +3134,7 @@
             <a:pPr algn="l"/>
             <a:r>
               <a:rPr lang="en-US"/>
-              <a:t>+ 6 buổi thực hành sẽ có 6 deadline: điểm phụ thuộc vào số bài chạy trên hackerrank đúng. </a:t>
-            </a:r>
-          </a:p>
-          <a:p>
-            <a:pPr algn="l"/>
-            <a:r>
-              <a:rPr lang="en-US"/>
-              <a:t>+ Điểm danh hợp lệ nếu có tên trên scoreboard.</a:t>
+              <a:t>+ 5 buổi thực hành sẽ có 5 deadline: điểm phụ thuộc vào số bài chạy trên hackerrank đúng. </a:t>
             </a:r>
           </a:p>
           <a:p>

</xml_diff>

<commit_message>
Add materials of PP
</commit_message>
<xml_diff>
--- a/IT002-OOP/Lab 1. BasicCplusplus.pptx
+++ b/IT002-OOP/Lab 1. BasicCplusplus.pptx
@@ -248,7 +248,7 @@
           <a:p>
             <a:fld id="{199A3582-EB61-4765-8E60-B3244E8DDD3F}" type="datetimeFigureOut">
               <a:rPr lang="en-US" smtClean="0"/>
-              <a:t>3/7/2022</a:t>
+              <a:t>3/8/2022</a:t>
             </a:fld>
             <a:endParaRPr lang="en-US"/>
           </a:p>
@@ -416,7 +416,7 @@
           <a:p>
             <a:fld id="{199A3582-EB61-4765-8E60-B3244E8DDD3F}" type="datetimeFigureOut">
               <a:rPr lang="en-US" smtClean="0"/>
-              <a:t>3/7/2022</a:t>
+              <a:t>3/8/2022</a:t>
             </a:fld>
             <a:endParaRPr lang="en-US"/>
           </a:p>
@@ -594,7 +594,7 @@
           <a:p>
             <a:fld id="{199A3582-EB61-4765-8E60-B3244E8DDD3F}" type="datetimeFigureOut">
               <a:rPr lang="en-US" smtClean="0"/>
-              <a:t>3/7/2022</a:t>
+              <a:t>3/8/2022</a:t>
             </a:fld>
             <a:endParaRPr lang="en-US"/>
           </a:p>
@@ -762,7 +762,7 @@
           <a:p>
             <a:fld id="{199A3582-EB61-4765-8E60-B3244E8DDD3F}" type="datetimeFigureOut">
               <a:rPr lang="en-US" smtClean="0"/>
-              <a:t>3/7/2022</a:t>
+              <a:t>3/8/2022</a:t>
             </a:fld>
             <a:endParaRPr lang="en-US"/>
           </a:p>
@@ -1007,7 +1007,7 @@
           <a:p>
             <a:fld id="{199A3582-EB61-4765-8E60-B3244E8DDD3F}" type="datetimeFigureOut">
               <a:rPr lang="en-US" smtClean="0"/>
-              <a:t>3/7/2022</a:t>
+              <a:t>3/8/2022</a:t>
             </a:fld>
             <a:endParaRPr lang="en-US"/>
           </a:p>
@@ -1236,7 +1236,7 @@
           <a:p>
             <a:fld id="{199A3582-EB61-4765-8E60-B3244E8DDD3F}" type="datetimeFigureOut">
               <a:rPr lang="en-US" smtClean="0"/>
-              <a:t>3/7/2022</a:t>
+              <a:t>3/8/2022</a:t>
             </a:fld>
             <a:endParaRPr lang="en-US"/>
           </a:p>
@@ -1600,7 +1600,7 @@
           <a:p>
             <a:fld id="{199A3582-EB61-4765-8E60-B3244E8DDD3F}" type="datetimeFigureOut">
               <a:rPr lang="en-US" smtClean="0"/>
-              <a:t>3/7/2022</a:t>
+              <a:t>3/8/2022</a:t>
             </a:fld>
             <a:endParaRPr lang="en-US"/>
           </a:p>
@@ -1717,7 +1717,7 @@
           <a:p>
             <a:fld id="{199A3582-EB61-4765-8E60-B3244E8DDD3F}" type="datetimeFigureOut">
               <a:rPr lang="en-US" smtClean="0"/>
-              <a:t>3/7/2022</a:t>
+              <a:t>3/8/2022</a:t>
             </a:fld>
             <a:endParaRPr lang="en-US"/>
           </a:p>
@@ -1812,7 +1812,7 @@
           <a:p>
             <a:fld id="{199A3582-EB61-4765-8E60-B3244E8DDD3F}" type="datetimeFigureOut">
               <a:rPr lang="en-US" smtClean="0"/>
-              <a:t>3/7/2022</a:t>
+              <a:t>3/8/2022</a:t>
             </a:fld>
             <a:endParaRPr lang="en-US"/>
           </a:p>
@@ -2087,7 +2087,7 @@
           <a:p>
             <a:fld id="{199A3582-EB61-4765-8E60-B3244E8DDD3F}" type="datetimeFigureOut">
               <a:rPr lang="en-US" smtClean="0"/>
-              <a:t>3/7/2022</a:t>
+              <a:t>3/8/2022</a:t>
             </a:fld>
             <a:endParaRPr lang="en-US"/>
           </a:p>
@@ -2339,7 +2339,7 @@
           <a:p>
             <a:fld id="{199A3582-EB61-4765-8E60-B3244E8DDD3F}" type="datetimeFigureOut">
               <a:rPr lang="en-US" smtClean="0"/>
-              <a:t>3/7/2022</a:t>
+              <a:t>3/8/2022</a:t>
             </a:fld>
             <a:endParaRPr lang="en-US"/>
           </a:p>
@@ -2550,7 +2550,7 @@
           <a:p>
             <a:fld id="{199A3582-EB61-4765-8E60-B3244E8DDD3F}" type="datetimeFigureOut">
               <a:rPr lang="en-US" smtClean="0"/>
-              <a:t>3/7/2022</a:t>
+              <a:t>3/8/2022</a:t>
             </a:fld>
             <a:endParaRPr lang="en-US"/>
           </a:p>

</xml_diff>